<commit_message>
aggiunta analisi localizzazioni a presentazione
</commit_message>
<xml_diff>
--- a/REPORT.pptx
+++ b/REPORT.pptx
@@ -5,10 +5,10 @@
     <p:sldMasterId id="2147483648" r:id="rId1"/>
   </p:sldMasterIdLst>
   <p:notesMasterIdLst>
-    <p:notesMasterId r:id="rId25"/>
+    <p:notesMasterId r:id="rId29"/>
   </p:notesMasterIdLst>
   <p:handoutMasterIdLst>
-    <p:handoutMasterId r:id="rId26"/>
+    <p:handoutMasterId r:id="rId30"/>
   </p:handoutMasterIdLst>
   <p:sldIdLst>
     <p:sldId id="318" r:id="rId2"/>
@@ -26,19 +26,23 @@
     <p:sldId id="351" r:id="rId14"/>
     <p:sldId id="350" r:id="rId15"/>
     <p:sldId id="340" r:id="rId16"/>
-    <p:sldId id="339" r:id="rId17"/>
-    <p:sldId id="334" r:id="rId18"/>
-    <p:sldId id="335" r:id="rId19"/>
-    <p:sldId id="336" r:id="rId20"/>
-    <p:sldId id="337" r:id="rId21"/>
-    <p:sldId id="338" r:id="rId22"/>
-    <p:sldId id="343" r:id="rId23"/>
-    <p:sldId id="342" r:id="rId24"/>
+    <p:sldId id="355" r:id="rId17"/>
+    <p:sldId id="354" r:id="rId18"/>
+    <p:sldId id="353" r:id="rId19"/>
+    <p:sldId id="352" r:id="rId20"/>
+    <p:sldId id="339" r:id="rId21"/>
+    <p:sldId id="334" r:id="rId22"/>
+    <p:sldId id="335" r:id="rId23"/>
+    <p:sldId id="336" r:id="rId24"/>
+    <p:sldId id="337" r:id="rId25"/>
+    <p:sldId id="338" r:id="rId26"/>
+    <p:sldId id="343" r:id="rId27"/>
+    <p:sldId id="342" r:id="rId28"/>
   </p:sldIdLst>
   <p:sldSz cx="12188825" cy="6858000"/>
   <p:notesSz cx="6858000" cy="9144000"/>
   <p:custDataLst>
-    <p:tags r:id="rId27"/>
+    <p:tags r:id="rId31"/>
   </p:custDataLst>
   <p:defaultTextStyle>
     <a:defPPr rtl="0">
@@ -215,6 +219,14 @@
     </p:ext>
   </p:extLst>
 </p:presentation>
+</file>
+
+<file path=ppt/revisionInfo.xml><?xml version="1.0" encoding="utf-8"?>
+<p1510:revInfo xmlns:a="http://schemas.openxmlformats.org/drawingml/2006/main" xmlns:r="http://schemas.openxmlformats.org/officeDocument/2006/relationships" xmlns:p1510="http://schemas.microsoft.com/office/powerpoint/2015/10/main">
+  <p1510:revLst>
+    <p1510:client id="{2D155CDB-E9E4-4A07-AB62-0B55ABA877F8}" v="11" dt="2021-05-16T08:42:42.939"/>
+  </p1510:revLst>
+</p1510:revInfo>
 </file>
 
 <file path=ppt/charts/chart1.xml><?xml version="1.0" encoding="utf-8"?>
@@ -1276,7 +1288,7 @@
             <a:pPr rtl="0"/>
             <a:fld id="{B0F83D96-5C9C-4534-86B5-5649DB8A678D}" type="datetime1">
               <a:rPr lang="it-IT" smtClean="0"/>
-              <a:t>14/05/21</a:t>
+              <a:t>16/05/2021</a:t>
             </a:fld>
             <a:endParaRPr lang="it-IT" dirty="0"/>
           </a:p>
@@ -1445,7 +1457,7 @@
             <a:fld id="{9DCB9B24-3351-4DE4-82DB-35F58E80D7CC}" type="datetime1">
               <a:rPr lang="it-IT" smtClean="0"/>
               <a:pPr/>
-              <a:t>14/05/21</a:t>
+              <a:t>16/05/2021</a:t>
             </a:fld>
             <a:endParaRPr lang="it-IT" dirty="0"/>
           </a:p>
@@ -1866,7 +1878,7 @@
             <a:pPr rtl="0"/>
             <a:fld id="{F93199CD-3E1B-4AE6-990F-76F925F5EA9F}" type="slidenum">
               <a:rPr lang="it-IT" smtClean="0"/>
-              <a:t>17</a:t>
+              <a:t>21</a:t>
             </a:fld>
             <a:endParaRPr lang="it-IT" dirty="0"/>
           </a:p>
@@ -1951,7 +1963,7 @@
             <a:pPr rtl="0"/>
             <a:fld id="{F93199CD-3E1B-4AE6-990F-76F925F5EA9F}" type="slidenum">
               <a:rPr lang="it-IT" smtClean="0"/>
-              <a:t>18</a:t>
+              <a:t>22</a:t>
             </a:fld>
             <a:endParaRPr lang="it-IT" dirty="0"/>
           </a:p>
@@ -2036,7 +2048,7 @@
             <a:pPr rtl="0"/>
             <a:fld id="{F93199CD-3E1B-4AE6-990F-76F925F5EA9F}" type="slidenum">
               <a:rPr lang="it-IT" smtClean="0"/>
-              <a:t>19</a:t>
+              <a:t>23</a:t>
             </a:fld>
             <a:endParaRPr lang="it-IT" dirty="0"/>
           </a:p>
@@ -2121,7 +2133,7 @@
             <a:pPr rtl="0"/>
             <a:fld id="{F93199CD-3E1B-4AE6-990F-76F925F5EA9F}" type="slidenum">
               <a:rPr lang="it-IT" smtClean="0"/>
-              <a:t>20</a:t>
+              <a:t>24</a:t>
             </a:fld>
             <a:endParaRPr lang="it-IT" dirty="0"/>
           </a:p>
@@ -2206,7 +2218,7 @@
             <a:pPr rtl="0"/>
             <a:fld id="{F93199CD-3E1B-4AE6-990F-76F925F5EA9F}" type="slidenum">
               <a:rPr lang="it-IT" smtClean="0"/>
-              <a:t>21</a:t>
+              <a:t>25</a:t>
             </a:fld>
             <a:endParaRPr lang="it-IT" dirty="0"/>
           </a:p>
@@ -2886,7 +2898,7 @@
             <a:pPr rtl="0"/>
             <a:fld id="{F93199CD-3E1B-4AE6-990F-76F925F5EA9F}" type="slidenum">
               <a:rPr lang="it-IT" smtClean="0"/>
-              <a:t>16</a:t>
+              <a:t>20</a:t>
             </a:fld>
             <a:endParaRPr lang="it-IT" dirty="0"/>
           </a:p>
@@ -3402,7 +3414,7 @@
             <a:fld id="{B47E2BE2-C2B3-4B55-8A92-AABDC382E8E6}" type="datetime1">
               <a:rPr lang="it-IT" smtClean="0"/>
               <a:pPr/>
-              <a:t>14/05/21</a:t>
+              <a:t>16/05/2021</a:t>
             </a:fld>
             <a:endParaRPr lang="it-IT" dirty="0"/>
           </a:p>
@@ -3615,7 +3627,7 @@
             <a:fld id="{13B0A373-E355-43F7-825A-91B793E35BAE}" type="datetime1">
               <a:rPr lang="it-IT" smtClean="0"/>
               <a:pPr/>
-              <a:t>14/05/21</a:t>
+              <a:t>16/05/2021</a:t>
             </a:fld>
             <a:endParaRPr lang="it-IT" dirty="0"/>
           </a:p>
@@ -3856,7 +3868,7 @@
             <a:fld id="{023992EC-44DB-4793-BACF-64A780A8628B}" type="datetime1">
               <a:rPr lang="it-IT" smtClean="0"/>
               <a:pPr/>
-              <a:t>14/05/21</a:t>
+              <a:t>16/05/2021</a:t>
             </a:fld>
             <a:endParaRPr lang="it-IT" dirty="0"/>
           </a:p>
@@ -4280,7 +4292,7 @@
             <a:fld id="{A47277E1-7621-4FF5-8428-BC5024298335}" type="datetime1">
               <a:rPr lang="it-IT" smtClean="0"/>
               <a:pPr/>
-              <a:t>14/05/21</a:t>
+              <a:t>16/05/2021</a:t>
             </a:fld>
             <a:endParaRPr lang="it-IT" dirty="0"/>
           </a:p>
@@ -4648,7 +4660,7 @@
             <a:fld id="{B79D17D8-68D2-446E-87A0-2D6562C8073F}" type="datetime1">
               <a:rPr lang="it-IT" smtClean="0"/>
               <a:pPr/>
-              <a:t>14/05/21</a:t>
+              <a:t>16/05/2021</a:t>
             </a:fld>
             <a:endParaRPr lang="it-IT" dirty="0"/>
           </a:p>
@@ -5164,7 +5176,7 @@
             <a:fld id="{2CC7AD1E-A15F-4D65-9E34-06DC5079DC1A}" type="datetime1">
               <a:rPr lang="it-IT" smtClean="0"/>
               <a:pPr/>
-              <a:t>14/05/21</a:t>
+              <a:t>16/05/2021</a:t>
             </a:fld>
             <a:endParaRPr lang="it-IT" dirty="0"/>
           </a:p>
@@ -5353,7 +5365,7 @@
             <a:fld id="{5DDD6FC7-94FB-49FD-9E96-34996EEF0D27}" type="datetime1">
               <a:rPr lang="it-IT" smtClean="0"/>
               <a:pPr/>
-              <a:t>14/05/21</a:t>
+              <a:t>16/05/2021</a:t>
             </a:fld>
             <a:endParaRPr lang="it-IT" dirty="0"/>
           </a:p>
@@ -5508,7 +5520,7 @@
             <a:fld id="{3D229277-2975-4D5A-9A7B-43F78A804847}" type="datetime1">
               <a:rPr lang="it-IT" smtClean="0"/>
               <a:pPr/>
-              <a:t>14/05/21</a:t>
+              <a:t>16/05/2021</a:t>
             </a:fld>
             <a:endParaRPr lang="it-IT" dirty="0"/>
           </a:p>
@@ -5829,7 +5841,7 @@
             <a:fld id="{278D3AD8-0B53-46CB-983C-0C8ACB1B11C7}" type="datetime1">
               <a:rPr lang="it-IT" smtClean="0"/>
               <a:pPr/>
-              <a:t>14/05/21</a:t>
+              <a:t>16/05/2021</a:t>
             </a:fld>
             <a:endParaRPr lang="it-IT" dirty="0"/>
           </a:p>
@@ -6383,7 +6395,7 @@
             <a:fld id="{C110D783-DB46-4E30-A2B2-B6F993D85061}" type="datetime1">
               <a:rPr lang="it-IT" smtClean="0"/>
               <a:pPr/>
-              <a:t>14/05/21</a:t>
+              <a:t>16/05/2021</a:t>
             </a:fld>
             <a:endParaRPr lang="it-IT" dirty="0"/>
           </a:p>
@@ -7673,13 +7685,13 @@
   <p:clrMapOvr>
     <a:masterClrMapping/>
   </p:clrMapOvr>
-  <mc:AlternateContent xmlns:mc="http://schemas.openxmlformats.org/markup-compatibility/2006">
-    <mc:Choice xmlns:p14="http://schemas.microsoft.com/office/powerpoint/2010/main" Requires="p14">
+  <mc:AlternateContent xmlns:mc="http://schemas.openxmlformats.org/markup-compatibility/2006" xmlns:p14="http://schemas.microsoft.com/office/powerpoint/2010/main">
+    <mc:Choice Requires="p14">
       <p:transition spd="med" p14:dur="700">
         <p:fade/>
       </p:transition>
     </mc:Choice>
-    <mc:Fallback>
+    <mc:Fallback xmlns="">
       <p:transition spd="med">
         <p:fade/>
       </p:transition>
@@ -7792,7 +7804,13 @@
       </p:grpSpPr>
       <p:sp>
         <p:nvSpPr>
-          <p:cNvPr id="2" name="Titolo 1"/>
+          <p:cNvPr id="4" name="Titolo 3">
+            <a:extLst>
+              <a:ext uri="{FF2B5EF4-FFF2-40B4-BE49-F238E27FC236}">
+                <a16:creationId xmlns:a16="http://schemas.microsoft.com/office/drawing/2014/main" id="{E59EE03A-E696-4D57-92A4-876B4C596B07}"/>
+              </a:ext>
+            </a:extLst>
+          </p:cNvPr>
           <p:cNvSpPr>
             <a:spLocks noGrp="1"/>
           </p:cNvSpPr>
@@ -7802,20 +7820,27 @@
         </p:nvSpPr>
         <p:spPr/>
         <p:txBody>
-          <a:bodyPr rtlCol="0"/>
-          <a:lstStyle/>
-          <a:p>
-            <a:pPr rtl="0"/>
+          <a:bodyPr>
+            <a:normAutofit fontScale="90000"/>
+          </a:bodyPr>
+          <a:lstStyle/>
+          <a:p>
             <a:r>
               <a:rPr lang="it-IT" dirty="0"/>
-              <a:t>Analisi per soggetti</a:t>
-            </a:r>
-          </a:p>
-        </p:txBody>
-      </p:sp>
-      <p:sp>
-        <p:nvSpPr>
-          <p:cNvPr id="4" name="Segnaposto testo 3"/>
+              <a:t>Analisi della distribuzione territoriale dei progetti relativi all’integrazione orizzontale/verticale</a:t>
+            </a:r>
+          </a:p>
+        </p:txBody>
+      </p:sp>
+      <p:sp>
+        <p:nvSpPr>
+          <p:cNvPr id="11" name="Segnaposto testo 10">
+            <a:extLst>
+              <a:ext uri="{FF2B5EF4-FFF2-40B4-BE49-F238E27FC236}">
+                <a16:creationId xmlns:a16="http://schemas.microsoft.com/office/drawing/2014/main" id="{8A4DB5C7-DDF2-4258-979C-C6B9F03FCDB3}"/>
+              </a:ext>
+            </a:extLst>
+          </p:cNvPr>
           <p:cNvSpPr>
             <a:spLocks noGrp="1"/>
           </p:cNvSpPr>
@@ -7825,18 +7850,120 @@
         </p:nvSpPr>
         <p:spPr/>
         <p:txBody>
-          <a:bodyPr rtlCol="0"/>
-          <a:lstStyle/>
-          <a:p>
-            <a:pPr rtl="0"/>
-            <a:endParaRPr lang="it-IT" dirty="0"/>
-          </a:p>
-        </p:txBody>
-      </p:sp>
+          <a:bodyPr/>
+          <a:lstStyle/>
+          <a:p>
+            <a:pPr algn="just"/>
+            <a:r>
+              <a:rPr lang="it-IT" dirty="0"/>
+              <a:t>Percentuale dei progetti limitati all’ambito nazionale o europeo rispetto al totale</a:t>
+            </a:r>
+          </a:p>
+        </p:txBody>
+      </p:sp>
+      <p:pic>
+        <p:nvPicPr>
+          <p:cNvPr id="8" name="Segnaposto contenuto 7">
+            <a:extLst>
+              <a:ext uri="{FF2B5EF4-FFF2-40B4-BE49-F238E27FC236}">
+                <a16:creationId xmlns:a16="http://schemas.microsoft.com/office/drawing/2014/main" id="{B2864C32-2002-4E2D-ACC6-F621C51094CD}"/>
+              </a:ext>
+            </a:extLst>
+          </p:cNvPr>
+          <p:cNvPicPr>
+            <a:picLocks noGrp="1" noChangeAspect="1"/>
+          </p:cNvPicPr>
+          <p:nvPr>
+            <p:ph sz="half" idx="2"/>
+          </p:nvPr>
+        </p:nvPicPr>
+        <p:blipFill>
+          <a:blip r:embed="rId2">
+            <a:extLst>
+              <a:ext uri="{28A0092B-C50C-407E-A947-70E740481C1C}">
+                <a14:useLocalDpi xmlns:a14="http://schemas.microsoft.com/office/drawing/2010/main" val="0"/>
+              </a:ext>
+            </a:extLst>
+          </a:blip>
+          <a:stretch>
+            <a:fillRect/>
+          </a:stretch>
+        </p:blipFill>
+        <p:spPr>
+          <a:xfrm>
+            <a:off x="1522413" y="2823255"/>
+            <a:ext cx="4800600" cy="3265714"/>
+          </a:xfrm>
+        </p:spPr>
+      </p:pic>
+      <p:sp>
+        <p:nvSpPr>
+          <p:cNvPr id="12" name="Segnaposto testo 11">
+            <a:extLst>
+              <a:ext uri="{FF2B5EF4-FFF2-40B4-BE49-F238E27FC236}">
+                <a16:creationId xmlns:a16="http://schemas.microsoft.com/office/drawing/2014/main" id="{5AF85350-EA14-4F23-BB29-B01DFC8E5C43}"/>
+              </a:ext>
+            </a:extLst>
+          </p:cNvPr>
+          <p:cNvSpPr>
+            <a:spLocks noGrp="1"/>
+          </p:cNvSpPr>
+          <p:nvPr>
+            <p:ph type="body" sz="quarter" idx="3"/>
+          </p:nvPr>
+        </p:nvSpPr>
+        <p:spPr/>
+        <p:txBody>
+          <a:bodyPr/>
+          <a:lstStyle/>
+          <a:p>
+            <a:pPr algn="just"/>
+            <a:r>
+              <a:rPr lang="it-IT" dirty="0"/>
+              <a:t>Confronto tra regioni italiane per progetti iniziati</a:t>
+            </a:r>
+          </a:p>
+        </p:txBody>
+      </p:sp>
+      <p:pic>
+        <p:nvPicPr>
+          <p:cNvPr id="16" name="Segnaposto contenuto 15">
+            <a:extLst>
+              <a:ext uri="{FF2B5EF4-FFF2-40B4-BE49-F238E27FC236}">
+                <a16:creationId xmlns:a16="http://schemas.microsoft.com/office/drawing/2014/main" id="{D1DBD6B5-36C5-4603-B1BB-915387E94A3E}"/>
+              </a:ext>
+            </a:extLst>
+          </p:cNvPr>
+          <p:cNvPicPr>
+            <a:picLocks noGrp="1" noChangeAspect="1"/>
+          </p:cNvPicPr>
+          <p:nvPr>
+            <p:ph sz="quarter" idx="4"/>
+          </p:nvPr>
+        </p:nvPicPr>
+        <p:blipFill>
+          <a:blip r:embed="rId3">
+            <a:extLst>
+              <a:ext uri="{28A0092B-C50C-407E-A947-70E740481C1C}">
+                <a14:useLocalDpi xmlns:a14="http://schemas.microsoft.com/office/drawing/2010/main" val="0"/>
+              </a:ext>
+            </a:extLst>
+          </a:blip>
+          <a:stretch>
+            <a:fillRect/>
+          </a:stretch>
+        </p:blipFill>
+        <p:spPr>
+          <a:xfrm>
+            <a:off x="6551613" y="2817748"/>
+            <a:ext cx="4800600" cy="3276729"/>
+          </a:xfrm>
+        </p:spPr>
+      </p:pic>
     </p:spTree>
     <p:extLst>
       <p:ext uri="{BB962C8B-B14F-4D97-AF65-F5344CB8AC3E}">
-        <p14:creationId xmlns:p14="http://schemas.microsoft.com/office/powerpoint/2010/main" val="2395117775"/>
+        <p14:creationId xmlns:p14="http://schemas.microsoft.com/office/powerpoint/2010/main" val="2601072384"/>
       </p:ext>
     </p:extLst>
   </p:cSld>
@@ -7877,7 +8004,13 @@
       </p:grpSpPr>
       <p:sp>
         <p:nvSpPr>
-          <p:cNvPr id="2" name="Titolo 1"/>
+          <p:cNvPr id="8" name="Title 1">
+            <a:extLst>
+              <a:ext uri="{FF2B5EF4-FFF2-40B4-BE49-F238E27FC236}">
+                <a16:creationId xmlns:a16="http://schemas.microsoft.com/office/drawing/2014/main" id="{A33C9268-F6D8-44F4-93E5-B9F9A1C276B4}"/>
+              </a:ext>
+            </a:extLst>
+          </p:cNvPr>
           <p:cNvSpPr>
             <a:spLocks noGrp="1"/>
           </p:cNvSpPr>
@@ -7885,103 +8018,100 @@
             <p:ph type="title"/>
           </p:nvPr>
         </p:nvSpPr>
-        <p:spPr/>
-        <p:txBody>
-          <a:bodyPr rtlCol="0"/>
-          <a:lstStyle/>
-          <a:p>
-            <a:pPr rtl="0"/>
+        <p:spPr>
+          <a:xfrm>
+            <a:off x="1522413" y="685800"/>
+            <a:ext cx="4114800" cy="1925637"/>
+          </a:xfrm>
+        </p:spPr>
+        <p:txBody>
+          <a:bodyPr anchor="b">
+            <a:normAutofit/>
+          </a:bodyPr>
+          <a:lstStyle/>
+          <a:p>
+            <a:r>
+              <a:rPr lang="it-IT" sz="2800" dirty="0"/>
+              <a:t>Analisi dei finanziamenti erogati dalle regioni a progetti relativi all’integrazione orizzontale/verticale</a:t>
+            </a:r>
+            <a:endParaRPr lang="en-US" sz="2800" dirty="0"/>
+          </a:p>
+        </p:txBody>
+      </p:sp>
+      <p:pic>
+        <p:nvPicPr>
+          <p:cNvPr id="11" name="Segnaposto immagine 10">
+            <a:extLst>
+              <a:ext uri="{FF2B5EF4-FFF2-40B4-BE49-F238E27FC236}">
+                <a16:creationId xmlns:a16="http://schemas.microsoft.com/office/drawing/2014/main" id="{DDD599B6-D745-4FA7-9618-7C5AEC2CE572}"/>
+              </a:ext>
+            </a:extLst>
+          </p:cNvPr>
+          <p:cNvPicPr>
+            <a:picLocks noGrp="1" noChangeAspect="1"/>
+          </p:cNvPicPr>
+          <p:nvPr>
+            <p:ph idx="1"/>
+          </p:nvPr>
+        </p:nvPicPr>
+        <p:blipFill>
+          <a:blip r:embed="rId2">
+            <a:extLst>
+              <a:ext uri="{28A0092B-C50C-407E-A947-70E740481C1C}">
+                <a14:useLocalDpi xmlns:a14="http://schemas.microsoft.com/office/drawing/2010/main" val="0"/>
+              </a:ext>
+            </a:extLst>
+          </a:blip>
+          <a:stretch>
+            <a:fillRect/>
+          </a:stretch>
+        </p:blipFill>
+        <p:spPr>
+          <a:xfrm>
+            <a:off x="6094414" y="1632560"/>
+            <a:ext cx="5257799" cy="3592879"/>
+          </a:xfrm>
+          <a:noFill/>
+        </p:spPr>
+      </p:pic>
+      <p:sp>
+        <p:nvSpPr>
+          <p:cNvPr id="17" name="Text Placeholder 3">
+            <a:extLst>
+              <a:ext uri="{FF2B5EF4-FFF2-40B4-BE49-F238E27FC236}">
+                <a16:creationId xmlns:a16="http://schemas.microsoft.com/office/drawing/2014/main" id="{14C6E85D-BAC6-445E-8F19-78837A665D1E}"/>
+              </a:ext>
+            </a:extLst>
+          </p:cNvPr>
+          <p:cNvSpPr>
+            <a:spLocks noGrp="1"/>
+          </p:cNvSpPr>
+          <p:nvPr>
+            <p:ph type="body" sz="half" idx="2"/>
+          </p:nvPr>
+        </p:nvSpPr>
+        <p:spPr>
+          <a:xfrm>
+            <a:off x="1522413" y="2895599"/>
+            <a:ext cx="4114800" cy="2590800"/>
+          </a:xfrm>
+        </p:spPr>
+        <p:txBody>
+          <a:bodyPr/>
+          <a:lstStyle/>
+          <a:p>
+            <a:pPr algn="just"/>
             <a:r>
               <a:rPr lang="it-IT" dirty="0"/>
-              <a:t>Aggiungere un titolo di diapositiva - 2</a:t>
-            </a:r>
-          </a:p>
-        </p:txBody>
-      </p:sp>
-      <p:sp>
-        <p:nvSpPr>
-          <p:cNvPr id="7" name="Segnaposto testo 6"/>
-          <p:cNvSpPr>
-            <a:spLocks noGrp="1"/>
-          </p:cNvSpPr>
-          <p:nvPr>
-            <p:ph type="body" idx="1"/>
-          </p:nvPr>
-        </p:nvSpPr>
-        <p:spPr/>
-        <p:txBody>
-          <a:bodyPr rtlCol="0"/>
-          <a:lstStyle/>
-          <a:p>
-            <a:pPr rtl="0"/>
-            <a:endParaRPr lang="it-IT" dirty="0"/>
-          </a:p>
-        </p:txBody>
-      </p:sp>
-      <p:sp>
-        <p:nvSpPr>
-          <p:cNvPr id="8" name="Segnaposto contenuto 7"/>
-          <p:cNvSpPr>
-            <a:spLocks noGrp="1"/>
-          </p:cNvSpPr>
-          <p:nvPr>
-            <p:ph sz="half" idx="2"/>
-          </p:nvPr>
-        </p:nvSpPr>
-        <p:spPr/>
-        <p:txBody>
-          <a:bodyPr rtlCol="0"/>
-          <a:lstStyle/>
-          <a:p>
-            <a:pPr rtl="0"/>
-            <a:endParaRPr lang="it-IT" dirty="0"/>
-          </a:p>
-        </p:txBody>
-      </p:sp>
-      <p:sp>
-        <p:nvSpPr>
-          <p:cNvPr id="9" name="Segnaposto testo 8"/>
-          <p:cNvSpPr>
-            <a:spLocks noGrp="1"/>
-          </p:cNvSpPr>
-          <p:nvPr>
-            <p:ph type="body" sz="quarter" idx="3"/>
-          </p:nvPr>
-        </p:nvSpPr>
-        <p:spPr/>
-        <p:txBody>
-          <a:bodyPr rtlCol="0"/>
-          <a:lstStyle/>
-          <a:p>
-            <a:pPr rtl="0"/>
-            <a:endParaRPr lang="it-IT" dirty="0"/>
-          </a:p>
-        </p:txBody>
-      </p:sp>
-      <p:sp>
-        <p:nvSpPr>
-          <p:cNvPr id="10" name="Segnaposto contenuto 9"/>
-          <p:cNvSpPr>
-            <a:spLocks noGrp="1"/>
-          </p:cNvSpPr>
-          <p:nvPr>
-            <p:ph sz="quarter" idx="4"/>
-          </p:nvPr>
-        </p:nvSpPr>
-        <p:spPr/>
-        <p:txBody>
-          <a:bodyPr rtlCol="0"/>
-          <a:lstStyle/>
-          <a:p>
-            <a:pPr rtl="0"/>
-            <a:endParaRPr lang="it-IT" dirty="0"/>
+              <a:t>Come risultante dall’istogramma, la Toscana è la regione che più di tutte ha investito in progetti inerenti all’integrazione orizzontale/verticale mentre circa la metà delle restanti regioni italiane non ne ha supportato nessuno. </a:t>
+            </a:r>
           </a:p>
         </p:txBody>
       </p:sp>
     </p:spTree>
     <p:extLst>
       <p:ext uri="{BB962C8B-B14F-4D97-AF65-F5344CB8AC3E}">
-        <p14:creationId xmlns:p14="http://schemas.microsoft.com/office/powerpoint/2010/main" val="3817187371"/>
+        <p14:creationId xmlns:p14="http://schemas.microsoft.com/office/powerpoint/2010/main" val="1568843234"/>
       </p:ext>
     </p:extLst>
   </p:cSld>
@@ -8022,7 +8152,13 @@
       </p:grpSpPr>
       <p:sp>
         <p:nvSpPr>
-          <p:cNvPr id="2" name="Titolo 1"/>
+          <p:cNvPr id="15" name="Title 1">
+            <a:extLst>
+              <a:ext uri="{FF2B5EF4-FFF2-40B4-BE49-F238E27FC236}">
+                <a16:creationId xmlns:a16="http://schemas.microsoft.com/office/drawing/2014/main" id="{8D6C3CF8-1556-49B9-B912-1AB9CA9160FE}"/>
+              </a:ext>
+            </a:extLst>
+          </p:cNvPr>
           <p:cNvSpPr>
             <a:spLocks noGrp="1"/>
           </p:cNvSpPr>
@@ -8030,23 +8166,176 @@
             <p:ph type="title"/>
           </p:nvPr>
         </p:nvSpPr>
-        <p:spPr/>
-        <p:txBody>
-          <a:bodyPr rtlCol="0"/>
-          <a:lstStyle/>
-          <a:p>
-            <a:pPr rtl="0"/>
+        <p:spPr>
+          <a:xfrm>
+            <a:off x="1522413" y="381000"/>
+            <a:ext cx="9829798" cy="1219200"/>
+          </a:xfrm>
+        </p:spPr>
+        <p:txBody>
+          <a:bodyPr>
+            <a:normAutofit/>
+          </a:bodyPr>
+          <a:lstStyle/>
+          <a:p>
             <a:r>
               <a:rPr lang="it-IT" dirty="0"/>
-              <a:t>Aggiungere un titolo di diapositiva - 3</a:t>
-            </a:r>
-          </a:p>
-        </p:txBody>
-      </p:sp>
+              <a:t>Analisi della distribuzione territoriale dei progetti relativi all’IoT (Internet of </a:t>
+            </a:r>
+            <a:r>
+              <a:rPr lang="it-IT" dirty="0" err="1"/>
+              <a:t>Things</a:t>
+            </a:r>
+            <a:r>
+              <a:rPr lang="it-IT" dirty="0"/>
+              <a:t>)</a:t>
+            </a:r>
+            <a:endParaRPr lang="en-US" dirty="0"/>
+          </a:p>
+        </p:txBody>
+      </p:sp>
+      <p:sp>
+        <p:nvSpPr>
+          <p:cNvPr id="17" name="Text Placeholder 2">
+            <a:extLst>
+              <a:ext uri="{FF2B5EF4-FFF2-40B4-BE49-F238E27FC236}">
+                <a16:creationId xmlns:a16="http://schemas.microsoft.com/office/drawing/2014/main" id="{E98473B8-3010-41B9-8C55-7A6B8AB7E909}"/>
+              </a:ext>
+            </a:extLst>
+          </p:cNvPr>
+          <p:cNvSpPr>
+            <a:spLocks noGrp="1"/>
+          </p:cNvSpPr>
+          <p:nvPr>
+            <p:ph type="body" idx="1"/>
+          </p:nvPr>
+        </p:nvSpPr>
+        <p:spPr>
+          <a:xfrm>
+            <a:off x="1522413" y="1828800"/>
+            <a:ext cx="4800600" cy="838200"/>
+          </a:xfrm>
+        </p:spPr>
+        <p:txBody>
+          <a:bodyPr/>
+          <a:lstStyle/>
+          <a:p>
+            <a:pPr algn="just"/>
+            <a:r>
+              <a:rPr lang="it-IT" dirty="0"/>
+              <a:t>Percentuale dei progetti limitati all’ambito nazionale o europeo rispetto al totale</a:t>
+            </a:r>
+          </a:p>
+        </p:txBody>
+      </p:sp>
+      <p:pic>
+        <p:nvPicPr>
+          <p:cNvPr id="5" name="Segnaposto contenuto 4">
+            <a:extLst>
+              <a:ext uri="{FF2B5EF4-FFF2-40B4-BE49-F238E27FC236}">
+                <a16:creationId xmlns:a16="http://schemas.microsoft.com/office/drawing/2014/main" id="{E4D3C7D3-C7D2-40E5-AFB5-E679B0D9BB33}"/>
+              </a:ext>
+            </a:extLst>
+          </p:cNvPr>
+          <p:cNvPicPr>
+            <a:picLocks noGrp="1" noChangeAspect="1"/>
+          </p:cNvPicPr>
+          <p:nvPr>
+            <p:ph sz="half" idx="2"/>
+          </p:nvPr>
+        </p:nvPicPr>
+        <p:blipFill>
+          <a:blip r:embed="rId2">
+            <a:extLst>
+              <a:ext uri="{28A0092B-C50C-407E-A947-70E740481C1C}">
+                <a14:useLocalDpi xmlns:a14="http://schemas.microsoft.com/office/drawing/2010/main" val="0"/>
+              </a:ext>
+            </a:extLst>
+          </a:blip>
+          <a:stretch>
+            <a:fillRect/>
+          </a:stretch>
+        </p:blipFill>
+        <p:spPr>
+          <a:xfrm>
+            <a:off x="1522413" y="2819483"/>
+            <a:ext cx="4800600" cy="3273259"/>
+          </a:xfrm>
+        </p:spPr>
+      </p:pic>
+      <p:sp>
+        <p:nvSpPr>
+          <p:cNvPr id="14" name="Text Placeholder 4">
+            <a:extLst>
+              <a:ext uri="{FF2B5EF4-FFF2-40B4-BE49-F238E27FC236}">
+                <a16:creationId xmlns:a16="http://schemas.microsoft.com/office/drawing/2014/main" id="{CED5E6C0-B110-44B9-9F2B-605986151821}"/>
+              </a:ext>
+            </a:extLst>
+          </p:cNvPr>
+          <p:cNvSpPr>
+            <a:spLocks noGrp="1"/>
+          </p:cNvSpPr>
+          <p:nvPr>
+            <p:ph type="body" sz="quarter" idx="3"/>
+          </p:nvPr>
+        </p:nvSpPr>
+        <p:spPr>
+          <a:xfrm>
+            <a:off x="6551613" y="1828800"/>
+            <a:ext cx="4800600" cy="838200"/>
+          </a:xfrm>
+        </p:spPr>
+        <p:txBody>
+          <a:bodyPr/>
+          <a:lstStyle/>
+          <a:p>
+            <a:pPr algn="just"/>
+            <a:r>
+              <a:rPr lang="it-IT" dirty="0"/>
+              <a:t>Confronto tra regioni italiane per progetti iniziati</a:t>
+            </a:r>
+          </a:p>
+        </p:txBody>
+      </p:sp>
+      <p:pic>
+        <p:nvPicPr>
+          <p:cNvPr id="19" name="Segnaposto contenuto 18">
+            <a:extLst>
+              <a:ext uri="{FF2B5EF4-FFF2-40B4-BE49-F238E27FC236}">
+                <a16:creationId xmlns:a16="http://schemas.microsoft.com/office/drawing/2014/main" id="{6D39F6EA-912B-4FCC-9679-5075D361746A}"/>
+              </a:ext>
+            </a:extLst>
+          </p:cNvPr>
+          <p:cNvPicPr>
+            <a:picLocks noGrp="1" noChangeAspect="1"/>
+          </p:cNvPicPr>
+          <p:nvPr>
+            <p:ph sz="quarter" idx="4"/>
+          </p:nvPr>
+        </p:nvPicPr>
+        <p:blipFill>
+          <a:blip r:embed="rId3">
+            <a:extLst>
+              <a:ext uri="{28A0092B-C50C-407E-A947-70E740481C1C}">
+                <a14:useLocalDpi xmlns:a14="http://schemas.microsoft.com/office/drawing/2010/main" val="0"/>
+              </a:ext>
+            </a:extLst>
+          </a:blip>
+          <a:stretch>
+            <a:fillRect/>
+          </a:stretch>
+        </p:blipFill>
+        <p:spPr>
+          <a:xfrm>
+            <a:off x="6551613" y="2821027"/>
+            <a:ext cx="4800600" cy="3270170"/>
+          </a:xfrm>
+        </p:spPr>
+      </p:pic>
     </p:spTree>
     <p:extLst>
       <p:ext uri="{BB962C8B-B14F-4D97-AF65-F5344CB8AC3E}">
-        <p14:creationId xmlns:p14="http://schemas.microsoft.com/office/powerpoint/2010/main" val="102866038"/>
+        <p14:creationId xmlns:p14="http://schemas.microsoft.com/office/powerpoint/2010/main" val="2428021166"/>
       </p:ext>
     </p:extLst>
   </p:cSld>
@@ -8087,10 +8376,10 @@
       </p:grpSpPr>
       <p:sp>
         <p:nvSpPr>
-          <p:cNvPr id="2" name="Titolo 1">
+          <p:cNvPr id="8" name="Title 1">
             <a:extLst>
               <a:ext uri="{FF2B5EF4-FFF2-40B4-BE49-F238E27FC236}">
-                <a16:creationId xmlns:a16="http://schemas.microsoft.com/office/drawing/2014/main" id="{02712C57-E01E-4019-9D5A-E3194D99F785}"/>
+                <a16:creationId xmlns:a16="http://schemas.microsoft.com/office/drawing/2014/main" id="{3039C7A2-C729-49D7-BE6E-52DDF4F856D5}"/>
               </a:ext>
             </a:extLst>
           </p:cNvPr>
@@ -8101,21 +8390,48 @@
             <p:ph type="title"/>
           </p:nvPr>
         </p:nvSpPr>
-        <p:spPr/>
-        <p:txBody>
-          <a:bodyPr/>
-          <a:lstStyle/>
-          <a:p>
-            <a:endParaRPr lang="it-IT"/>
-          </a:p>
-        </p:txBody>
-      </p:sp>
-      <p:sp>
-        <p:nvSpPr>
-          <p:cNvPr id="3" name="Segnaposto contenuto 2">
+        <p:spPr>
+          <a:xfrm>
+            <a:off x="1522413" y="685800"/>
+            <a:ext cx="4114800" cy="1925637"/>
+          </a:xfrm>
+        </p:spPr>
+        <p:txBody>
+          <a:bodyPr anchor="b">
+            <a:normAutofit/>
+          </a:bodyPr>
+          <a:lstStyle/>
+          <a:p>
+            <a:r>
+              <a:rPr lang="it-IT" sz="2800" dirty="0"/>
+              <a:t>Analisi dei finanziamenti erogati dalle regioni a progetti relativi all’</a:t>
+            </a:r>
+            <a:r>
+              <a:rPr lang="it-IT" sz="2800" dirty="0" err="1"/>
+              <a:t>Iot</a:t>
+            </a:r>
+            <a:r>
+              <a:rPr lang="it-IT" sz="2800" dirty="0"/>
+              <a:t> (Internet of </a:t>
+            </a:r>
+            <a:r>
+              <a:rPr lang="it-IT" sz="2800" dirty="0" err="1"/>
+              <a:t>Things</a:t>
+            </a:r>
+            <a:r>
+              <a:rPr lang="it-IT" sz="2800" dirty="0"/>
+              <a:t>)</a:t>
+            </a:r>
+            <a:endParaRPr lang="en-US" sz="2800" dirty="0"/>
+          </a:p>
+        </p:txBody>
+      </p:sp>
+      <p:sp>
+        <p:nvSpPr>
+          <p:cNvPr id="26" name="Text Placeholder 3">
             <a:extLst>
               <a:ext uri="{FF2B5EF4-FFF2-40B4-BE49-F238E27FC236}">
-                <a16:creationId xmlns:a16="http://schemas.microsoft.com/office/drawing/2014/main" id="{1C901181-BD7C-4D14-8540-4C06632FEA11}"/>
+                <a16:creationId xmlns:a16="http://schemas.microsoft.com/office/drawing/2014/main" id="{F221D00B-B172-40A2-A8E2-8866E6D62795}"/>
               </a:ext>
             </a:extLst>
           </p:cNvPr>
@@ -8123,47 +8439,66 @@
             <a:spLocks noGrp="1"/>
           </p:cNvSpPr>
           <p:nvPr>
-            <p:ph idx="1"/>
-          </p:nvPr>
-        </p:nvSpPr>
-        <p:spPr/>
+            <p:ph type="body" sz="half" idx="2"/>
+          </p:nvPr>
+        </p:nvSpPr>
+        <p:spPr>
+          <a:xfrm>
+            <a:off x="1522413" y="2895599"/>
+            <a:ext cx="4114800" cy="2590800"/>
+          </a:xfrm>
+        </p:spPr>
         <p:txBody>
           <a:bodyPr/>
           <a:lstStyle/>
           <a:p>
-            <a:endParaRPr lang="it-IT"/>
-          </a:p>
-        </p:txBody>
-      </p:sp>
-      <p:sp>
-        <p:nvSpPr>
-          <p:cNvPr id="4" name="Segnaposto testo 3">
+            <a:pPr algn="just"/>
+            <a:r>
+              <a:rPr lang="it-IT" dirty="0"/>
+              <a:t>Come era prevedibile, l’andamento dei finanziamenti per regione rispetto ai soli progetti che si occupano di IoT è sovrapponibile a quello ottenuto considerando tutti i progetti dell’area dell’integrazione orizzontale/verticale.</a:t>
+            </a:r>
+          </a:p>
+        </p:txBody>
+      </p:sp>
+      <p:pic>
+        <p:nvPicPr>
+          <p:cNvPr id="17" name="Segnaposto contenuto 16">
             <a:extLst>
               <a:ext uri="{FF2B5EF4-FFF2-40B4-BE49-F238E27FC236}">
-                <a16:creationId xmlns:a16="http://schemas.microsoft.com/office/drawing/2014/main" id="{09DDB2DD-13B8-4C8D-B973-3498C69589CD}"/>
+                <a16:creationId xmlns:a16="http://schemas.microsoft.com/office/drawing/2014/main" id="{BC8DFA3E-4CF2-461B-9C93-4C9A0AE2148E}"/>
               </a:ext>
             </a:extLst>
           </p:cNvPr>
-          <p:cNvSpPr>
-            <a:spLocks noGrp="1"/>
-          </p:cNvSpPr>
-          <p:nvPr>
-            <p:ph type="body" sz="half" idx="2"/>
-          </p:nvPr>
-        </p:nvSpPr>
-        <p:spPr/>
-        <p:txBody>
-          <a:bodyPr/>
-          <a:lstStyle/>
-          <a:p>
-            <a:endParaRPr lang="it-IT"/>
-          </a:p>
-        </p:txBody>
-      </p:sp>
+          <p:cNvPicPr>
+            <a:picLocks noGrp="1" noChangeAspect="1"/>
+          </p:cNvPicPr>
+          <p:nvPr>
+            <p:ph idx="1"/>
+          </p:nvPr>
+        </p:nvPicPr>
+        <p:blipFill>
+          <a:blip r:embed="rId2">
+            <a:extLst>
+              <a:ext uri="{28A0092B-C50C-407E-A947-70E740481C1C}">
+                <a14:useLocalDpi xmlns:a14="http://schemas.microsoft.com/office/drawing/2010/main" val="0"/>
+              </a:ext>
+            </a:extLst>
+          </a:blip>
+          <a:stretch>
+            <a:fillRect/>
+          </a:stretch>
+        </p:blipFill>
+        <p:spPr>
+          <a:xfrm>
+            <a:off x="6282118" y="1767824"/>
+            <a:ext cx="4882389" cy="3322352"/>
+          </a:xfrm>
+        </p:spPr>
+      </p:pic>
     </p:spTree>
     <p:extLst>
       <p:ext uri="{BB962C8B-B14F-4D97-AF65-F5344CB8AC3E}">
-        <p14:creationId xmlns:p14="http://schemas.microsoft.com/office/powerpoint/2010/main" val="3216253470"/>
+        <p14:creationId xmlns:p14="http://schemas.microsoft.com/office/powerpoint/2010/main" val="2280467472"/>
       </p:ext>
     </p:extLst>
   </p:cSld>
@@ -8315,39 +8650,19 @@
             <a:pPr rtl="0"/>
             <a:r>
               <a:rPr lang="it-IT" dirty="0"/>
-              <a:t>Aggiungere un titolo di diapositiva - 4</a:t>
-            </a:r>
-          </a:p>
-        </p:txBody>
-      </p:sp>
-      <p:sp>
-        <p:nvSpPr>
-          <p:cNvPr id="5" name="Segnaposto contenuto 4"/>
-          <p:cNvSpPr>
-            <a:spLocks noGrp="1"/>
-          </p:cNvSpPr>
-          <p:nvPr>
-            <p:ph idx="1"/>
-          </p:nvPr>
-        </p:nvSpPr>
-        <p:spPr/>
-        <p:txBody>
-          <a:bodyPr rtlCol="0"/>
-          <a:lstStyle/>
-          <a:p>
-            <a:pPr rtl="0"/>
-            <a:endParaRPr lang="it-IT" dirty="0"/>
-          </a:p>
-        </p:txBody>
-      </p:sp>
-      <p:sp>
-        <p:nvSpPr>
-          <p:cNvPr id="6" name="Segnaposto testo 5"/>
-          <p:cNvSpPr>
-            <a:spLocks noGrp="1"/>
-          </p:cNvSpPr>
-          <p:nvPr>
-            <p:ph type="body" sz="half" idx="2"/>
+              <a:t>Analisi per soggetti</a:t>
+            </a:r>
+          </a:p>
+        </p:txBody>
+      </p:sp>
+      <p:sp>
+        <p:nvSpPr>
+          <p:cNvPr id="4" name="Segnaposto testo 3"/>
+          <p:cNvSpPr>
+            <a:spLocks noGrp="1"/>
+          </p:cNvSpPr>
+          <p:nvPr>
+            <p:ph type="body" idx="1"/>
           </p:nvPr>
         </p:nvSpPr>
         <p:spPr/>
@@ -8363,7 +8678,7 @@
     </p:spTree>
     <p:extLst>
       <p:ext uri="{BB962C8B-B14F-4D97-AF65-F5344CB8AC3E}">
-        <p14:creationId xmlns:p14="http://schemas.microsoft.com/office/powerpoint/2010/main" val="2551545397"/>
+        <p14:creationId xmlns:p14="http://schemas.microsoft.com/office/powerpoint/2010/main" val="2395117775"/>
       </p:ext>
     </p:extLst>
   </p:cSld>
@@ -8404,7 +8719,7 @@
       </p:grpSpPr>
       <p:sp>
         <p:nvSpPr>
-          <p:cNvPr id="3" name="Titolo 2"/>
+          <p:cNvPr id="2" name="Titolo 1"/>
           <p:cNvSpPr>
             <a:spLocks noGrp="1"/>
           </p:cNvSpPr>
@@ -8420,31 +8735,79 @@
             <a:pPr rtl="0"/>
             <a:r>
               <a:rPr lang="it-IT" dirty="0"/>
-              <a:t>Aggiungere un titolo di diapositiva - 5</a:t>
-            </a:r>
-          </a:p>
-        </p:txBody>
-      </p:sp>
-      <p:sp>
-        <p:nvSpPr>
-          <p:cNvPr id="5" name="Segnaposto immagine 4" descr="Segnaposto vuoto per aggiungere un'immagine. Fare clic sul segnaposto e selezionare l'immagine che si vuole aggiungere"/>
-          <p:cNvSpPr>
-            <a:spLocks noGrp="1"/>
-          </p:cNvSpPr>
-          <p:nvPr>
-            <p:ph type="pic" idx="1"/>
-          </p:nvPr>
-        </p:nvSpPr>
-        <p:spPr/>
-      </p:sp>
-      <p:sp>
-        <p:nvSpPr>
-          <p:cNvPr id="6" name="Segnaposto testo 5"/>
-          <p:cNvSpPr>
-            <a:spLocks noGrp="1"/>
-          </p:cNvSpPr>
-          <p:nvPr>
-            <p:ph type="body" sz="half" idx="2"/>
+              <a:t>Aggiungere un titolo di diapositiva - 2</a:t>
+            </a:r>
+          </a:p>
+        </p:txBody>
+      </p:sp>
+      <p:sp>
+        <p:nvSpPr>
+          <p:cNvPr id="7" name="Segnaposto testo 6"/>
+          <p:cNvSpPr>
+            <a:spLocks noGrp="1"/>
+          </p:cNvSpPr>
+          <p:nvPr>
+            <p:ph type="body" idx="1"/>
+          </p:nvPr>
+        </p:nvSpPr>
+        <p:spPr/>
+        <p:txBody>
+          <a:bodyPr rtlCol="0"/>
+          <a:lstStyle/>
+          <a:p>
+            <a:pPr rtl="0"/>
+            <a:endParaRPr lang="it-IT" dirty="0"/>
+          </a:p>
+        </p:txBody>
+      </p:sp>
+      <p:sp>
+        <p:nvSpPr>
+          <p:cNvPr id="8" name="Segnaposto contenuto 7"/>
+          <p:cNvSpPr>
+            <a:spLocks noGrp="1"/>
+          </p:cNvSpPr>
+          <p:nvPr>
+            <p:ph sz="half" idx="2"/>
+          </p:nvPr>
+        </p:nvSpPr>
+        <p:spPr/>
+        <p:txBody>
+          <a:bodyPr rtlCol="0"/>
+          <a:lstStyle/>
+          <a:p>
+            <a:pPr rtl="0"/>
+            <a:endParaRPr lang="it-IT" dirty="0"/>
+          </a:p>
+        </p:txBody>
+      </p:sp>
+      <p:sp>
+        <p:nvSpPr>
+          <p:cNvPr id="9" name="Segnaposto testo 8"/>
+          <p:cNvSpPr>
+            <a:spLocks noGrp="1"/>
+          </p:cNvSpPr>
+          <p:nvPr>
+            <p:ph type="body" sz="quarter" idx="3"/>
+          </p:nvPr>
+        </p:nvSpPr>
+        <p:spPr/>
+        <p:txBody>
+          <a:bodyPr rtlCol="0"/>
+          <a:lstStyle/>
+          <a:p>
+            <a:pPr rtl="0"/>
+            <a:endParaRPr lang="it-IT" dirty="0"/>
+          </a:p>
+        </p:txBody>
+      </p:sp>
+      <p:sp>
+        <p:nvSpPr>
+          <p:cNvPr id="10" name="Segnaposto contenuto 9"/>
+          <p:cNvSpPr>
+            <a:spLocks noGrp="1"/>
+          </p:cNvSpPr>
+          <p:nvPr>
+            <p:ph sz="quarter" idx="4"/>
           </p:nvPr>
         </p:nvSpPr>
         <p:spPr/>
@@ -8460,7 +8823,7 @@
     </p:spTree>
     <p:extLst>
       <p:ext uri="{BB962C8B-B14F-4D97-AF65-F5344CB8AC3E}">
-        <p14:creationId xmlns:p14="http://schemas.microsoft.com/office/powerpoint/2010/main" val="577046454"/>
+        <p14:creationId xmlns:p14="http://schemas.microsoft.com/office/powerpoint/2010/main" val="3817187371"/>
       </p:ext>
     </p:extLst>
   </p:cSld>
@@ -8501,6 +8864,390 @@
       </p:grpSpPr>
       <p:sp>
         <p:nvSpPr>
+          <p:cNvPr id="2" name="Titolo 1"/>
+          <p:cNvSpPr>
+            <a:spLocks noGrp="1"/>
+          </p:cNvSpPr>
+          <p:nvPr>
+            <p:ph type="title"/>
+          </p:nvPr>
+        </p:nvSpPr>
+        <p:spPr/>
+        <p:txBody>
+          <a:bodyPr rtlCol="0"/>
+          <a:lstStyle/>
+          <a:p>
+            <a:pPr rtl="0"/>
+            <a:r>
+              <a:rPr lang="it-IT" dirty="0"/>
+              <a:t>Aggiungere un titolo di diapositiva - 3</a:t>
+            </a:r>
+          </a:p>
+        </p:txBody>
+      </p:sp>
+    </p:spTree>
+    <p:extLst>
+      <p:ext uri="{BB962C8B-B14F-4D97-AF65-F5344CB8AC3E}">
+        <p14:creationId xmlns:p14="http://schemas.microsoft.com/office/powerpoint/2010/main" val="102866038"/>
+      </p:ext>
+    </p:extLst>
+  </p:cSld>
+  <p:clrMapOvr>
+    <a:masterClrMapping/>
+  </p:clrMapOvr>
+  <mc:AlternateContent xmlns:mc="http://schemas.openxmlformats.org/markup-compatibility/2006" xmlns:p14="http://schemas.microsoft.com/office/powerpoint/2010/main">
+    <mc:Choice Requires="p14">
+      <p:transition spd="med" p14:dur="700">
+        <p:fade/>
+      </p:transition>
+    </mc:Choice>
+    <mc:Fallback xmlns="">
+      <p:transition spd="med">
+        <p:fade/>
+      </p:transition>
+    </mc:Fallback>
+  </mc:AlternateContent>
+</p:sld>
+</file>
+
+<file path=ppt/slides/slide23.xml><?xml version="1.0" encoding="utf-8"?>
+<p:sld xmlns:a="http://schemas.openxmlformats.org/drawingml/2006/main" xmlns:r="http://schemas.openxmlformats.org/officeDocument/2006/relationships" xmlns:p="http://schemas.openxmlformats.org/presentationml/2006/main">
+  <p:cSld>
+    <p:spTree>
+      <p:nvGrpSpPr>
+        <p:cNvPr id="1" name=""/>
+        <p:cNvGrpSpPr/>
+        <p:nvPr/>
+      </p:nvGrpSpPr>
+      <p:grpSpPr>
+        <a:xfrm>
+          <a:off x="0" y="0"/>
+          <a:ext cx="0" cy="0"/>
+          <a:chOff x="0" y="0"/>
+          <a:chExt cx="0" cy="0"/>
+        </a:xfrm>
+      </p:grpSpPr>
+      <p:sp>
+        <p:nvSpPr>
+          <p:cNvPr id="2" name="Titolo 1">
+            <a:extLst>
+              <a:ext uri="{FF2B5EF4-FFF2-40B4-BE49-F238E27FC236}">
+                <a16:creationId xmlns:a16="http://schemas.microsoft.com/office/drawing/2014/main" id="{02712C57-E01E-4019-9D5A-E3194D99F785}"/>
+              </a:ext>
+            </a:extLst>
+          </p:cNvPr>
+          <p:cNvSpPr>
+            <a:spLocks noGrp="1"/>
+          </p:cNvSpPr>
+          <p:nvPr>
+            <p:ph type="title"/>
+          </p:nvPr>
+        </p:nvSpPr>
+        <p:spPr/>
+        <p:txBody>
+          <a:bodyPr/>
+          <a:lstStyle/>
+          <a:p>
+            <a:endParaRPr lang="it-IT"/>
+          </a:p>
+        </p:txBody>
+      </p:sp>
+      <p:sp>
+        <p:nvSpPr>
+          <p:cNvPr id="3" name="Segnaposto contenuto 2">
+            <a:extLst>
+              <a:ext uri="{FF2B5EF4-FFF2-40B4-BE49-F238E27FC236}">
+                <a16:creationId xmlns:a16="http://schemas.microsoft.com/office/drawing/2014/main" id="{1C901181-BD7C-4D14-8540-4C06632FEA11}"/>
+              </a:ext>
+            </a:extLst>
+          </p:cNvPr>
+          <p:cNvSpPr>
+            <a:spLocks noGrp="1"/>
+          </p:cNvSpPr>
+          <p:nvPr>
+            <p:ph idx="1"/>
+          </p:nvPr>
+        </p:nvSpPr>
+        <p:spPr/>
+        <p:txBody>
+          <a:bodyPr/>
+          <a:lstStyle/>
+          <a:p>
+            <a:endParaRPr lang="it-IT"/>
+          </a:p>
+        </p:txBody>
+      </p:sp>
+      <p:sp>
+        <p:nvSpPr>
+          <p:cNvPr id="4" name="Segnaposto testo 3">
+            <a:extLst>
+              <a:ext uri="{FF2B5EF4-FFF2-40B4-BE49-F238E27FC236}">
+                <a16:creationId xmlns:a16="http://schemas.microsoft.com/office/drawing/2014/main" id="{09DDB2DD-13B8-4C8D-B973-3498C69589CD}"/>
+              </a:ext>
+            </a:extLst>
+          </p:cNvPr>
+          <p:cNvSpPr>
+            <a:spLocks noGrp="1"/>
+          </p:cNvSpPr>
+          <p:nvPr>
+            <p:ph type="body" sz="half" idx="2"/>
+          </p:nvPr>
+        </p:nvSpPr>
+        <p:spPr/>
+        <p:txBody>
+          <a:bodyPr/>
+          <a:lstStyle/>
+          <a:p>
+            <a:endParaRPr lang="it-IT"/>
+          </a:p>
+        </p:txBody>
+      </p:sp>
+    </p:spTree>
+    <p:extLst>
+      <p:ext uri="{BB962C8B-B14F-4D97-AF65-F5344CB8AC3E}">
+        <p14:creationId xmlns:p14="http://schemas.microsoft.com/office/powerpoint/2010/main" val="3216253470"/>
+      </p:ext>
+    </p:extLst>
+  </p:cSld>
+  <p:clrMapOvr>
+    <a:masterClrMapping/>
+  </p:clrMapOvr>
+  <mc:AlternateContent xmlns:mc="http://schemas.openxmlformats.org/markup-compatibility/2006" xmlns:p14="http://schemas.microsoft.com/office/powerpoint/2010/main">
+    <mc:Choice Requires="p14">
+      <p:transition spd="med" p14:dur="700">
+        <p:fade/>
+      </p:transition>
+    </mc:Choice>
+    <mc:Fallback xmlns="">
+      <p:transition spd="med">
+        <p:fade/>
+      </p:transition>
+    </mc:Fallback>
+  </mc:AlternateContent>
+</p:sld>
+</file>
+
+<file path=ppt/slides/slide24.xml><?xml version="1.0" encoding="utf-8"?>
+<p:sld xmlns:a="http://schemas.openxmlformats.org/drawingml/2006/main" xmlns:r="http://schemas.openxmlformats.org/officeDocument/2006/relationships" xmlns:p="http://schemas.openxmlformats.org/presentationml/2006/main">
+  <p:cSld>
+    <p:spTree>
+      <p:nvGrpSpPr>
+        <p:cNvPr id="1" name=""/>
+        <p:cNvGrpSpPr/>
+        <p:nvPr/>
+      </p:nvGrpSpPr>
+      <p:grpSpPr>
+        <a:xfrm>
+          <a:off x="0" y="0"/>
+          <a:ext cx="0" cy="0"/>
+          <a:chOff x="0" y="0"/>
+          <a:chExt cx="0" cy="0"/>
+        </a:xfrm>
+      </p:grpSpPr>
+      <p:sp>
+        <p:nvSpPr>
+          <p:cNvPr id="2" name="Titolo 1"/>
+          <p:cNvSpPr>
+            <a:spLocks noGrp="1"/>
+          </p:cNvSpPr>
+          <p:nvPr>
+            <p:ph type="title"/>
+          </p:nvPr>
+        </p:nvSpPr>
+        <p:spPr/>
+        <p:txBody>
+          <a:bodyPr rtlCol="0"/>
+          <a:lstStyle/>
+          <a:p>
+            <a:pPr rtl="0"/>
+            <a:r>
+              <a:rPr lang="it-IT" dirty="0"/>
+              <a:t>Aggiungere un titolo di diapositiva - 4</a:t>
+            </a:r>
+          </a:p>
+        </p:txBody>
+      </p:sp>
+      <p:sp>
+        <p:nvSpPr>
+          <p:cNvPr id="5" name="Segnaposto contenuto 4"/>
+          <p:cNvSpPr>
+            <a:spLocks noGrp="1"/>
+          </p:cNvSpPr>
+          <p:nvPr>
+            <p:ph idx="1"/>
+          </p:nvPr>
+        </p:nvSpPr>
+        <p:spPr/>
+        <p:txBody>
+          <a:bodyPr rtlCol="0"/>
+          <a:lstStyle/>
+          <a:p>
+            <a:pPr rtl="0"/>
+            <a:endParaRPr lang="it-IT" dirty="0"/>
+          </a:p>
+        </p:txBody>
+      </p:sp>
+      <p:sp>
+        <p:nvSpPr>
+          <p:cNvPr id="6" name="Segnaposto testo 5"/>
+          <p:cNvSpPr>
+            <a:spLocks noGrp="1"/>
+          </p:cNvSpPr>
+          <p:nvPr>
+            <p:ph type="body" sz="half" idx="2"/>
+          </p:nvPr>
+        </p:nvSpPr>
+        <p:spPr/>
+        <p:txBody>
+          <a:bodyPr rtlCol="0"/>
+          <a:lstStyle/>
+          <a:p>
+            <a:pPr rtl="0"/>
+            <a:endParaRPr lang="it-IT" dirty="0"/>
+          </a:p>
+        </p:txBody>
+      </p:sp>
+    </p:spTree>
+    <p:extLst>
+      <p:ext uri="{BB962C8B-B14F-4D97-AF65-F5344CB8AC3E}">
+        <p14:creationId xmlns:p14="http://schemas.microsoft.com/office/powerpoint/2010/main" val="2551545397"/>
+      </p:ext>
+    </p:extLst>
+  </p:cSld>
+  <p:clrMapOvr>
+    <a:masterClrMapping/>
+  </p:clrMapOvr>
+  <mc:AlternateContent xmlns:mc="http://schemas.openxmlformats.org/markup-compatibility/2006" xmlns:p14="http://schemas.microsoft.com/office/powerpoint/2010/main">
+    <mc:Choice Requires="p14">
+      <p:transition spd="med" p14:dur="700">
+        <p:fade/>
+      </p:transition>
+    </mc:Choice>
+    <mc:Fallback xmlns="">
+      <p:transition spd="med">
+        <p:fade/>
+      </p:transition>
+    </mc:Fallback>
+  </mc:AlternateContent>
+</p:sld>
+</file>
+
+<file path=ppt/slides/slide25.xml><?xml version="1.0" encoding="utf-8"?>
+<p:sld xmlns:a="http://schemas.openxmlformats.org/drawingml/2006/main" xmlns:r="http://schemas.openxmlformats.org/officeDocument/2006/relationships" xmlns:p="http://schemas.openxmlformats.org/presentationml/2006/main">
+  <p:cSld>
+    <p:spTree>
+      <p:nvGrpSpPr>
+        <p:cNvPr id="1" name=""/>
+        <p:cNvGrpSpPr/>
+        <p:nvPr/>
+      </p:nvGrpSpPr>
+      <p:grpSpPr>
+        <a:xfrm>
+          <a:off x="0" y="0"/>
+          <a:ext cx="0" cy="0"/>
+          <a:chOff x="0" y="0"/>
+          <a:chExt cx="0" cy="0"/>
+        </a:xfrm>
+      </p:grpSpPr>
+      <p:sp>
+        <p:nvSpPr>
+          <p:cNvPr id="3" name="Titolo 2"/>
+          <p:cNvSpPr>
+            <a:spLocks noGrp="1"/>
+          </p:cNvSpPr>
+          <p:nvPr>
+            <p:ph type="title"/>
+          </p:nvPr>
+        </p:nvSpPr>
+        <p:spPr/>
+        <p:txBody>
+          <a:bodyPr rtlCol="0"/>
+          <a:lstStyle/>
+          <a:p>
+            <a:pPr rtl="0"/>
+            <a:r>
+              <a:rPr lang="it-IT" dirty="0"/>
+              <a:t>Aggiungere un titolo di diapositiva - 5</a:t>
+            </a:r>
+          </a:p>
+        </p:txBody>
+      </p:sp>
+      <p:sp>
+        <p:nvSpPr>
+          <p:cNvPr id="5" name="Segnaposto immagine 4" descr="Segnaposto vuoto per aggiungere un'immagine. Fare clic sul segnaposto e selezionare l'immagine che si vuole aggiungere"/>
+          <p:cNvSpPr>
+            <a:spLocks noGrp="1"/>
+          </p:cNvSpPr>
+          <p:nvPr>
+            <p:ph type="pic" idx="1"/>
+          </p:nvPr>
+        </p:nvSpPr>
+        <p:spPr/>
+      </p:sp>
+      <p:sp>
+        <p:nvSpPr>
+          <p:cNvPr id="6" name="Segnaposto testo 5"/>
+          <p:cNvSpPr>
+            <a:spLocks noGrp="1"/>
+          </p:cNvSpPr>
+          <p:nvPr>
+            <p:ph type="body" sz="half" idx="2"/>
+          </p:nvPr>
+        </p:nvSpPr>
+        <p:spPr/>
+        <p:txBody>
+          <a:bodyPr rtlCol="0"/>
+          <a:lstStyle/>
+          <a:p>
+            <a:pPr rtl="0"/>
+            <a:endParaRPr lang="it-IT" dirty="0"/>
+          </a:p>
+        </p:txBody>
+      </p:sp>
+    </p:spTree>
+    <p:extLst>
+      <p:ext uri="{BB962C8B-B14F-4D97-AF65-F5344CB8AC3E}">
+        <p14:creationId xmlns:p14="http://schemas.microsoft.com/office/powerpoint/2010/main" val="577046454"/>
+      </p:ext>
+    </p:extLst>
+  </p:cSld>
+  <p:clrMapOvr>
+    <a:masterClrMapping/>
+  </p:clrMapOvr>
+  <mc:AlternateContent xmlns:mc="http://schemas.openxmlformats.org/markup-compatibility/2006" xmlns:p14="http://schemas.microsoft.com/office/powerpoint/2010/main">
+    <mc:Choice Requires="p14">
+      <p:transition spd="med" p14:dur="700">
+        <p:fade/>
+      </p:transition>
+    </mc:Choice>
+    <mc:Fallback xmlns="">
+      <p:transition spd="med">
+        <p:fade/>
+      </p:transition>
+    </mc:Fallback>
+  </mc:AlternateContent>
+</p:sld>
+</file>
+
+<file path=ppt/slides/slide26.xml><?xml version="1.0" encoding="utf-8"?>
+<p:sld xmlns:a="http://schemas.openxmlformats.org/drawingml/2006/main" xmlns:r="http://schemas.openxmlformats.org/officeDocument/2006/relationships" xmlns:p="http://schemas.openxmlformats.org/presentationml/2006/main">
+  <p:cSld>
+    <p:spTree>
+      <p:nvGrpSpPr>
+        <p:cNvPr id="1" name=""/>
+        <p:cNvGrpSpPr/>
+        <p:nvPr/>
+      </p:nvGrpSpPr>
+      <p:grpSpPr>
+        <a:xfrm>
+          <a:off x="0" y="0"/>
+          <a:ext cx="0" cy="0"/>
+          <a:chOff x="0" y="0"/>
+          <a:chExt cx="0" cy="0"/>
+        </a:xfrm>
+      </p:grpSpPr>
+      <p:sp>
+        <p:nvSpPr>
           <p:cNvPr id="2" name="Titolo 1">
             <a:extLst>
               <a:ext uri="{FF2B5EF4-FFF2-40B4-BE49-F238E27FC236}">
@@ -8578,7 +9325,7 @@
 </p:sld>
 </file>
 
-<file path=ppt/slides/slide23.xml><?xml version="1.0" encoding="utf-8"?>
+<file path=ppt/slides/slide27.xml><?xml version="1.0" encoding="utf-8"?>
 <p:sld xmlns:a="http://schemas.openxmlformats.org/drawingml/2006/main" xmlns:r="http://schemas.openxmlformats.org/officeDocument/2006/relationships" xmlns:p="http://schemas.openxmlformats.org/presentationml/2006/main">
   <p:cSld>
     <p:spTree>

</xml_diff>